<commit_message>
2025-09-25 AlexNet, VGGNet CNN 모델 만들기
</commit_message>
<xml_diff>
--- a/image/이미지 생성용.pptx
+++ b/image/이미지 생성용.pptx
@@ -105,6 +105,11 @@
       </a:defRPr>
     </a:lvl9pPr>
   </p:defaultTextStyle>
+  <p:extLst>
+    <p:ext uri="{EFAFB233-063F-42B5-8137-9DF3F51BA10A}">
+      <p15:sldGuideLst xmlns:p15="http://schemas.microsoft.com/office/powerpoint/2012/main"/>
+    </p:ext>
+  </p:extLst>
 </p:presentation>
 </file>
 
@@ -239,7 +244,7 @@
           <a:p>
             <a:fld id="{F0CD9246-440E-46C2-946E-50CD81230ED2}" type="datetimeFigureOut">
               <a:rPr lang="ko-KR" altLang="en-US" smtClean="0"/>
-              <a:t>2025-09-23</a:t>
+              <a:t>2025-09-25</a:t>
             </a:fld>
             <a:endParaRPr lang="ko-KR" altLang="en-US"/>
           </a:p>
@@ -409,7 +414,7 @@
           <a:p>
             <a:fld id="{F0CD9246-440E-46C2-946E-50CD81230ED2}" type="datetimeFigureOut">
               <a:rPr lang="ko-KR" altLang="en-US" smtClean="0"/>
-              <a:t>2025-09-23</a:t>
+              <a:t>2025-09-25</a:t>
             </a:fld>
             <a:endParaRPr lang="ko-KR" altLang="en-US"/>
           </a:p>
@@ -589,7 +594,7 @@
           <a:p>
             <a:fld id="{F0CD9246-440E-46C2-946E-50CD81230ED2}" type="datetimeFigureOut">
               <a:rPr lang="ko-KR" altLang="en-US" smtClean="0"/>
-              <a:t>2025-09-23</a:t>
+              <a:t>2025-09-25</a:t>
             </a:fld>
             <a:endParaRPr lang="ko-KR" altLang="en-US"/>
           </a:p>
@@ -759,7 +764,7 @@
           <a:p>
             <a:fld id="{F0CD9246-440E-46C2-946E-50CD81230ED2}" type="datetimeFigureOut">
               <a:rPr lang="ko-KR" altLang="en-US" smtClean="0"/>
-              <a:t>2025-09-23</a:t>
+              <a:t>2025-09-25</a:t>
             </a:fld>
             <a:endParaRPr lang="ko-KR" altLang="en-US"/>
           </a:p>
@@ -1005,7 +1010,7 @@
           <a:p>
             <a:fld id="{F0CD9246-440E-46C2-946E-50CD81230ED2}" type="datetimeFigureOut">
               <a:rPr lang="ko-KR" altLang="en-US" smtClean="0"/>
-              <a:t>2025-09-23</a:t>
+              <a:t>2025-09-25</a:t>
             </a:fld>
             <a:endParaRPr lang="ko-KR" altLang="en-US"/>
           </a:p>
@@ -1237,7 +1242,7 @@
           <a:p>
             <a:fld id="{F0CD9246-440E-46C2-946E-50CD81230ED2}" type="datetimeFigureOut">
               <a:rPr lang="ko-KR" altLang="en-US" smtClean="0"/>
-              <a:t>2025-09-23</a:t>
+              <a:t>2025-09-25</a:t>
             </a:fld>
             <a:endParaRPr lang="ko-KR" altLang="en-US"/>
           </a:p>
@@ -1604,7 +1609,7 @@
           <a:p>
             <a:fld id="{F0CD9246-440E-46C2-946E-50CD81230ED2}" type="datetimeFigureOut">
               <a:rPr lang="ko-KR" altLang="en-US" smtClean="0"/>
-              <a:t>2025-09-23</a:t>
+              <a:t>2025-09-25</a:t>
             </a:fld>
             <a:endParaRPr lang="ko-KR" altLang="en-US"/>
           </a:p>
@@ -1722,7 +1727,7 @@
           <a:p>
             <a:fld id="{F0CD9246-440E-46C2-946E-50CD81230ED2}" type="datetimeFigureOut">
               <a:rPr lang="ko-KR" altLang="en-US" smtClean="0"/>
-              <a:t>2025-09-23</a:t>
+              <a:t>2025-09-25</a:t>
             </a:fld>
             <a:endParaRPr lang="ko-KR" altLang="en-US"/>
           </a:p>
@@ -1817,7 +1822,7 @@
           <a:p>
             <a:fld id="{F0CD9246-440E-46C2-946E-50CD81230ED2}" type="datetimeFigureOut">
               <a:rPr lang="ko-KR" altLang="en-US" smtClean="0"/>
-              <a:t>2025-09-23</a:t>
+              <a:t>2025-09-25</a:t>
             </a:fld>
             <a:endParaRPr lang="ko-KR" altLang="en-US"/>
           </a:p>
@@ -2094,7 +2099,7 @@
           <a:p>
             <a:fld id="{F0CD9246-440E-46C2-946E-50CD81230ED2}" type="datetimeFigureOut">
               <a:rPr lang="ko-KR" altLang="en-US" smtClean="0"/>
-              <a:t>2025-09-23</a:t>
+              <a:t>2025-09-25</a:t>
             </a:fld>
             <a:endParaRPr lang="ko-KR" altLang="en-US"/>
           </a:p>
@@ -2347,7 +2352,7 @@
           <a:p>
             <a:fld id="{F0CD9246-440E-46C2-946E-50CD81230ED2}" type="datetimeFigureOut">
               <a:rPr lang="ko-KR" altLang="en-US" smtClean="0"/>
-              <a:t>2025-09-23</a:t>
+              <a:t>2025-09-25</a:t>
             </a:fld>
             <a:endParaRPr lang="ko-KR" altLang="en-US"/>
           </a:p>
@@ -2560,7 +2565,7 @@
           <a:p>
             <a:fld id="{F0CD9246-440E-46C2-946E-50CD81230ED2}" type="datetimeFigureOut">
               <a:rPr lang="ko-KR" altLang="en-US" smtClean="0"/>
-              <a:t>2025-09-23</a:t>
+              <a:t>2025-09-25</a:t>
             </a:fld>
             <a:endParaRPr lang="ko-KR" altLang="en-US"/>
           </a:p>
@@ -2965,8 +2970,8 @@
           <a:chExt cx="0" cy="0"/>
         </a:xfrm>
       </p:grpSpPr>
-      <mc:AlternateContent xmlns:mc="http://schemas.openxmlformats.org/markup-compatibility/2006">
-        <mc:Choice xmlns:a14="http://schemas.microsoft.com/office/drawing/2010/main" Requires="a14">
+      <mc:AlternateContent xmlns:mc="http://schemas.openxmlformats.org/markup-compatibility/2006" xmlns:a14="http://schemas.microsoft.com/office/drawing/2010/main">
+        <mc:Choice Requires="a14">
           <p:sp>
             <p:nvSpPr>
               <p:cNvPr id="4" name="TextBox 3"/>
@@ -3149,7 +3154,7 @@
             </p:txBody>
           </p:sp>
         </mc:Choice>
-        <mc:Fallback>
+        <mc:Fallback xmlns="">
           <p:sp>
             <p:nvSpPr>
               <p:cNvPr id="4" name="TextBox 3"/>
@@ -3188,8 +3193,8 @@
           </p:sp>
         </mc:Fallback>
       </mc:AlternateContent>
-      <mc:AlternateContent xmlns:mc="http://schemas.openxmlformats.org/markup-compatibility/2006">
-        <mc:Choice xmlns:a14="http://schemas.microsoft.com/office/drawing/2010/main" Requires="a14">
+      <mc:AlternateContent xmlns:mc="http://schemas.openxmlformats.org/markup-compatibility/2006" xmlns:a14="http://schemas.microsoft.com/office/drawing/2010/main">
+        <mc:Choice Requires="a14">
           <p:sp>
             <p:nvSpPr>
               <p:cNvPr id="5" name="TextBox 4"/>
@@ -3487,7 +3492,7 @@
             </p:txBody>
           </p:sp>
         </mc:Choice>
-        <mc:Fallback>
+        <mc:Fallback xmlns="">
           <p:sp>
             <p:nvSpPr>
               <p:cNvPr id="5" name="TextBox 4"/>
@@ -3540,8 +3545,8 @@
             <a:chExt cx="5220071" cy="677814"/>
           </a:xfrm>
         </p:grpSpPr>
-        <mc:AlternateContent xmlns:mc="http://schemas.openxmlformats.org/markup-compatibility/2006">
-          <mc:Choice xmlns:a14="http://schemas.microsoft.com/office/drawing/2010/main" Requires="a14">
+        <mc:AlternateContent xmlns:mc="http://schemas.openxmlformats.org/markup-compatibility/2006" xmlns:a14="http://schemas.microsoft.com/office/drawing/2010/main">
+          <mc:Choice Requires="a14">
             <p:sp>
               <p:nvSpPr>
                 <p:cNvPr id="7" name="TextBox 6"/>
@@ -3577,6 +3582,7 @@
                   </a:lvl1pPr>
                 </a:lstStyle>
                 <a:p>
+                  <a:pPr/>
                   <a14:m>
                     <m:oMathPara xmlns:m="http://schemas.openxmlformats.org/officeDocument/2006/math">
                       <m:oMathParaPr>
@@ -3666,13 +3672,17 @@
                           </m:sub>
                         </m:sSub>
                         <m:r>
-                          <a:rPr lang="en-US" altLang="ko-KR"/>
+                          <a:rPr lang="en-US" altLang="ko-KR">
+                            <a:latin typeface="Cambria Math" panose="02040503050406030204" pitchFamily="18" charset="0"/>
+                          </a:rPr>
                           <m:t>=</m:t>
                         </m:r>
                         <m:f>
                           <m:fPr>
                             <m:ctrlPr>
-                              <a:rPr lang="en-US" altLang="ko-KR" smtClean="0"/>
+                              <a:rPr lang="en-US" altLang="ko-KR" i="1" smtClean="0">
+                                <a:latin typeface="Cambria Math" panose="02040503050406030204" pitchFamily="18" charset="0"/>
+                              </a:rPr>
                             </m:ctrlPr>
                           </m:fPr>
                           <m:num>
@@ -3776,7 +3786,7 @@
               </p:txBody>
             </p:sp>
           </mc:Choice>
-          <mc:Fallback>
+          <mc:Fallback xmlns="">
             <p:sp>
               <p:nvSpPr>
                 <p:cNvPr id="7" name="TextBox 6"/>
@@ -3815,8 +3825,8 @@
             </p:sp>
           </mc:Fallback>
         </mc:AlternateContent>
-        <mc:AlternateContent xmlns:mc="http://schemas.openxmlformats.org/markup-compatibility/2006">
-          <mc:Choice xmlns:a14="http://schemas.microsoft.com/office/drawing/2010/main" Requires="a14">
+        <mc:AlternateContent xmlns:mc="http://schemas.openxmlformats.org/markup-compatibility/2006" xmlns:a14="http://schemas.microsoft.com/office/drawing/2010/main">
+          <mc:Choice Requires="a14">
             <p:sp>
               <p:nvSpPr>
                 <p:cNvPr id="8" name="TextBox 7"/>
@@ -3852,6 +3862,7 @@
                   </a:lvl1pPr>
                 </a:lstStyle>
                 <a:p>
+                  <a:pPr/>
                   <a14:m>
                     <m:oMathPara xmlns:m="http://schemas.openxmlformats.org/officeDocument/2006/math">
                       <m:oMathParaPr>
@@ -3941,13 +3952,17 @@
                           </m:sub>
                         </m:sSub>
                         <m:r>
-                          <a:rPr lang="en-US" altLang="ko-KR"/>
+                          <a:rPr lang="en-US" altLang="ko-KR">
+                            <a:latin typeface="Cambria Math" panose="02040503050406030204" pitchFamily="18" charset="0"/>
+                          </a:rPr>
                           <m:t>=</m:t>
                         </m:r>
                         <m:f>
                           <m:fPr>
                             <m:ctrlPr>
-                              <a:rPr lang="en-US" altLang="ko-KR" smtClean="0"/>
+                              <a:rPr lang="en-US" altLang="ko-KR" i="1" smtClean="0">
+                                <a:latin typeface="Cambria Math" panose="02040503050406030204" pitchFamily="18" charset="0"/>
+                              </a:rPr>
                             </m:ctrlPr>
                           </m:fPr>
                           <m:num>
@@ -4023,13 +4038,7 @@
                               <a:rPr lang="en-US" altLang="ko-KR" b="0" i="1" smtClean="0">
                                 <a:latin typeface="Cambria Math" panose="02040503050406030204" pitchFamily="18" charset="0"/>
                               </a:rPr>
-                              <m:t>+...</m:t>
-                            </m:r>
-                            <m:r>
-                              <a:rPr lang="en-US" altLang="ko-KR" b="0" i="1" smtClean="0">
-                                <a:latin typeface="Cambria Math" panose="02040503050406030204" pitchFamily="18" charset="0"/>
-                              </a:rPr>
-                              <m:t>+</m:t>
+                              <m:t>+...+</m:t>
                             </m:r>
                             <m:sSup>
                               <m:sSupPr>
@@ -4052,13 +4061,7 @@
                                   <a:rPr lang="en-US" altLang="ko-KR" b="0" i="1" smtClean="0">
                                     <a:latin typeface="Cambria Math" panose="02040503050406030204" pitchFamily="18" charset="0"/>
                                   </a:rPr>
-                                  <m:t>𝑧</m:t>
-                                </m:r>
-                                <m:r>
-                                  <a:rPr lang="en-US" altLang="ko-KR" b="0" i="1" smtClean="0">
-                                    <a:latin typeface="Cambria Math" panose="02040503050406030204" pitchFamily="18" charset="0"/>
-                                  </a:rPr>
-                                  <m:t>𝑗</m:t>
+                                  <m:t>𝑧𝑗</m:t>
                                 </m:r>
                               </m:sup>
                             </m:sSup>
@@ -4143,7 +4146,7 @@
               </p:txBody>
             </p:sp>
           </mc:Choice>
-          <mc:Fallback>
+          <mc:Fallback xmlns="">
             <p:sp>
               <p:nvSpPr>
                 <p:cNvPr id="8" name="TextBox 7"/>
@@ -4237,6 +4240,96 @@
           <a:xfrm>
             <a:off x="565118" y="166255"/>
             <a:ext cx="1990898" cy="1712422"/>
+          </a:xfrm>
+          <a:prstGeom prst="rect">
+            <a:avLst/>
+          </a:prstGeom>
+        </p:spPr>
+      </p:pic>
+      <p:pic>
+        <p:nvPicPr>
+          <p:cNvPr id="3" name="그림 2"/>
+          <p:cNvPicPr>
+            <a:picLocks noChangeAspect="1"/>
+          </p:cNvPicPr>
+          <p:nvPr/>
+        </p:nvPicPr>
+        <p:blipFill>
+          <a:blip r:embed="rId3" cstate="print">
+            <a:extLst>
+              <a:ext uri="{28A0092B-C50C-407E-A947-70E740481C1C}">
+                <a14:useLocalDpi xmlns:a14="http://schemas.microsoft.com/office/drawing/2010/main" val="0"/>
+              </a:ext>
+            </a:extLst>
+          </a:blip>
+          <a:stretch>
+            <a:fillRect/>
+          </a:stretch>
+        </p:blipFill>
+        <p:spPr>
+          <a:xfrm>
+            <a:off x="3435927" y="333940"/>
+            <a:ext cx="4018372" cy="1625970"/>
+          </a:xfrm>
+          <a:prstGeom prst="rect">
+            <a:avLst/>
+          </a:prstGeom>
+        </p:spPr>
+      </p:pic>
+      <p:pic>
+        <p:nvPicPr>
+          <p:cNvPr id="4" name="그림 3"/>
+          <p:cNvPicPr>
+            <a:picLocks noChangeAspect="1"/>
+          </p:cNvPicPr>
+          <p:nvPr/>
+        </p:nvPicPr>
+        <p:blipFill>
+          <a:blip r:embed="rId4" cstate="print">
+            <a:extLst>
+              <a:ext uri="{28A0092B-C50C-407E-A947-70E740481C1C}">
+                <a14:useLocalDpi xmlns:a14="http://schemas.microsoft.com/office/drawing/2010/main" val="0"/>
+              </a:ext>
+            </a:extLst>
+          </a:blip>
+          <a:stretch>
+            <a:fillRect/>
+          </a:stretch>
+        </p:blipFill>
+        <p:spPr>
+          <a:xfrm>
+            <a:off x="1048502" y="2779057"/>
+            <a:ext cx="5025044" cy="1456806"/>
+          </a:xfrm>
+          <a:prstGeom prst="rect">
+            <a:avLst/>
+          </a:prstGeom>
+        </p:spPr>
+      </p:pic>
+      <p:pic>
+        <p:nvPicPr>
+          <p:cNvPr id="5" name="그림 4"/>
+          <p:cNvPicPr>
+            <a:picLocks noChangeAspect="1"/>
+          </p:cNvPicPr>
+          <p:nvPr/>
+        </p:nvPicPr>
+        <p:blipFill>
+          <a:blip r:embed="rId5" cstate="print">
+            <a:extLst>
+              <a:ext uri="{28A0092B-C50C-407E-A947-70E740481C1C}">
+                <a14:useLocalDpi xmlns:a14="http://schemas.microsoft.com/office/drawing/2010/main" val="0"/>
+              </a:ext>
+            </a:extLst>
+          </a:blip>
+          <a:stretch>
+            <a:fillRect/>
+          </a:stretch>
+        </p:blipFill>
+        <p:spPr>
+          <a:xfrm>
+            <a:off x="6747889" y="2779057"/>
+            <a:ext cx="4025022" cy="2605209"/>
           </a:xfrm>
           <a:prstGeom prst="rect">
             <a:avLst/>

</xml_diff>